<commit_message>
Before Collection Entity Initialize
</commit_message>
<xml_diff>
--- a/docs/images/modeler/BehaviourLifecycle.pptx
+++ b/docs/images/modeler/BehaviourLifecycle.pptx
@@ -112,6 +112,147 @@
 </p:presentation>
 </file>
 
+<file path=ppt/revisionInfo.xml><?xml version="1.0" encoding="utf-8"?>
+<p1510:revInfo xmlns:a="http://schemas.openxmlformats.org/drawingml/2006/main" xmlns:r="http://schemas.openxmlformats.org/officeDocument/2006/relationships" xmlns:p1510="http://schemas.microsoft.com/office/powerpoint/2015/10/main">
+  <p1510:revLst>
+    <p1510:client id="{CC0A1D89-ECE3-41D7-9B03-DABCAEFDE813}" v="4" dt="2021-02-01T06:05:29.203"/>
+  </p1510:revLst>
+</p1510:revInfo>
+</file>
+
+<file path=ppt/changesInfos/changesInfo1.xml><?xml version="1.0" encoding="utf-8"?>
+<pc:chgInfo xmlns:a="http://schemas.openxmlformats.org/drawingml/2006/main" xmlns:r="http://schemas.openxmlformats.org/officeDocument/2006/relationships" xmlns:ac="http://schemas.microsoft.com/office/drawing/2013/main/command" xmlns:pc="http://schemas.microsoft.com/office/powerpoint/2013/main/command">
+  <pc:docChgLst>
+    <pc:chgData name="David Caldas" userId="04af3e41-9f26-4099-bc8b-5a96c79558d2" providerId="ADAL" clId="{CC0A1D89-ECE3-41D7-9B03-DABCAEFDE813}"/>
+    <pc:docChg chg="modSld">
+      <pc:chgData name="David Caldas" userId="04af3e41-9f26-4099-bc8b-5a96c79558d2" providerId="ADAL" clId="{CC0A1D89-ECE3-41D7-9B03-DABCAEFDE813}" dt="2021-02-01T06:05:34.104" v="65" actId="1076"/>
+      <pc:docMkLst>
+        <pc:docMk/>
+      </pc:docMkLst>
+      <pc:sldChg chg="addSp modSp mod">
+        <pc:chgData name="David Caldas" userId="04af3e41-9f26-4099-bc8b-5a96c79558d2" providerId="ADAL" clId="{CC0A1D89-ECE3-41D7-9B03-DABCAEFDE813}" dt="2021-02-01T06:05:34.104" v="65" actId="1076"/>
+        <pc:sldMkLst>
+          <pc:docMk/>
+          <pc:sldMk cId="2717091713" sldId="256"/>
+        </pc:sldMkLst>
+        <pc:spChg chg="mod">
+          <ac:chgData name="David Caldas" userId="04af3e41-9f26-4099-bc8b-5a96c79558d2" providerId="ADAL" clId="{CC0A1D89-ECE3-41D7-9B03-DABCAEFDE813}" dt="2021-02-01T06:04:48.630" v="59" actId="12789"/>
+          <ac:spMkLst>
+            <pc:docMk/>
+            <pc:sldMk cId="2717091713" sldId="256"/>
+            <ac:spMk id="6" creationId="{CF64C3FF-6B08-49BD-B409-3FA889F3E6C5}"/>
+          </ac:spMkLst>
+        </pc:spChg>
+        <pc:spChg chg="mod">
+          <ac:chgData name="David Caldas" userId="04af3e41-9f26-4099-bc8b-5a96c79558d2" providerId="ADAL" clId="{CC0A1D89-ECE3-41D7-9B03-DABCAEFDE813}" dt="2021-02-01T06:04:59.779" v="60" actId="12789"/>
+          <ac:spMkLst>
+            <pc:docMk/>
+            <pc:sldMk cId="2717091713" sldId="256"/>
+            <ac:spMk id="7" creationId="{F5D85020-21AA-44F7-B703-0CF987B9D161}"/>
+          </ac:spMkLst>
+        </pc:spChg>
+        <pc:spChg chg="mod">
+          <ac:chgData name="David Caldas" userId="04af3e41-9f26-4099-bc8b-5a96c79558d2" providerId="ADAL" clId="{CC0A1D89-ECE3-41D7-9B03-DABCAEFDE813}" dt="2021-02-01T06:05:04.087" v="61" actId="12789"/>
+          <ac:spMkLst>
+            <pc:docMk/>
+            <pc:sldMk cId="2717091713" sldId="256"/>
+            <ac:spMk id="8" creationId="{E47785F0-DD73-45EE-B8DA-3E5832659F85}"/>
+          </ac:spMkLst>
+        </pc:spChg>
+        <pc:spChg chg="mod">
+          <ac:chgData name="David Caldas" userId="04af3e41-9f26-4099-bc8b-5a96c79558d2" providerId="ADAL" clId="{CC0A1D89-ECE3-41D7-9B03-DABCAEFDE813}" dt="2021-02-01T06:05:08.122" v="62" actId="12789"/>
+          <ac:spMkLst>
+            <pc:docMk/>
+            <pc:sldMk cId="2717091713" sldId="256"/>
+            <ac:spMk id="9" creationId="{40086225-9191-4755-9221-CFAD22FFBC67}"/>
+          </ac:spMkLst>
+        </pc:spChg>
+        <pc:spChg chg="mod">
+          <ac:chgData name="David Caldas" userId="04af3e41-9f26-4099-bc8b-5a96c79558d2" providerId="ADAL" clId="{CC0A1D89-ECE3-41D7-9B03-DABCAEFDE813}" dt="2021-02-01T06:05:15.337" v="63" actId="12789"/>
+          <ac:spMkLst>
+            <pc:docMk/>
+            <pc:sldMk cId="2717091713" sldId="256"/>
+            <ac:spMk id="10" creationId="{1CBFA5E5-5E93-4DD5-B2BA-57AC783BDA57}"/>
+          </ac:spMkLst>
+        </pc:spChg>
+        <pc:spChg chg="mod">
+          <ac:chgData name="David Caldas" userId="04af3e41-9f26-4099-bc8b-5a96c79558d2" providerId="ADAL" clId="{CC0A1D89-ECE3-41D7-9B03-DABCAEFDE813}" dt="2021-02-01T06:02:01.059" v="4" actId="404"/>
+          <ac:spMkLst>
+            <pc:docMk/>
+            <pc:sldMk cId="2717091713" sldId="256"/>
+            <ac:spMk id="11" creationId="{6D50C63C-A87A-4030-B14B-1F6FDC27C91A}"/>
+          </ac:spMkLst>
+        </pc:spChg>
+        <pc:spChg chg="mod">
+          <ac:chgData name="David Caldas" userId="04af3e41-9f26-4099-bc8b-5a96c79558d2" providerId="ADAL" clId="{CC0A1D89-ECE3-41D7-9B03-DABCAEFDE813}" dt="2021-02-01T06:03:39.491" v="35" actId="14100"/>
+          <ac:spMkLst>
+            <pc:docMk/>
+            <pc:sldMk cId="2717091713" sldId="256"/>
+            <ac:spMk id="12" creationId="{FDED7D77-8882-4999-92C6-A301760DE433}"/>
+          </ac:spMkLst>
+        </pc:spChg>
+        <pc:spChg chg="mod">
+          <ac:chgData name="David Caldas" userId="04af3e41-9f26-4099-bc8b-5a96c79558d2" providerId="ADAL" clId="{CC0A1D89-ECE3-41D7-9B03-DABCAEFDE813}" dt="2021-02-01T06:04:48.630" v="59" actId="12789"/>
+          <ac:spMkLst>
+            <pc:docMk/>
+            <pc:sldMk cId="2717091713" sldId="256"/>
+            <ac:spMk id="13" creationId="{F32D9A5A-E172-4AEA-995C-274838D07629}"/>
+          </ac:spMkLst>
+        </pc:spChg>
+        <pc:spChg chg="mod">
+          <ac:chgData name="David Caldas" userId="04af3e41-9f26-4099-bc8b-5a96c79558d2" providerId="ADAL" clId="{CC0A1D89-ECE3-41D7-9B03-DABCAEFDE813}" dt="2021-02-01T06:04:59.779" v="60" actId="12789"/>
+          <ac:spMkLst>
+            <pc:docMk/>
+            <pc:sldMk cId="2717091713" sldId="256"/>
+            <ac:spMk id="14" creationId="{3208EA9A-2023-4DC8-ACD1-704896E63A00}"/>
+          </ac:spMkLst>
+        </pc:spChg>
+        <pc:spChg chg="add mod">
+          <ac:chgData name="David Caldas" userId="04af3e41-9f26-4099-bc8b-5a96c79558d2" providerId="ADAL" clId="{CC0A1D89-ECE3-41D7-9B03-DABCAEFDE813}" dt="2021-02-01T06:01:10.713" v="1" actId="1076"/>
+          <ac:spMkLst>
+            <pc:docMk/>
+            <pc:sldMk cId="2717091713" sldId="256"/>
+            <ac:spMk id="15" creationId="{7A56AD5C-657F-450B-B846-C7693E83340A}"/>
+          </ac:spMkLst>
+        </pc:spChg>
+        <pc:spChg chg="add mod">
+          <ac:chgData name="David Caldas" userId="04af3e41-9f26-4099-bc8b-5a96c79558d2" providerId="ADAL" clId="{CC0A1D89-ECE3-41D7-9B03-DABCAEFDE813}" dt="2021-02-01T06:05:04.087" v="61" actId="12789"/>
+          <ac:spMkLst>
+            <pc:docMk/>
+            <pc:sldMk cId="2717091713" sldId="256"/>
+            <ac:spMk id="16" creationId="{4B0377CE-D3FF-46D3-869E-AB54D7B7752E}"/>
+          </ac:spMkLst>
+        </pc:spChg>
+        <pc:spChg chg="mod">
+          <ac:chgData name="David Caldas" userId="04af3e41-9f26-4099-bc8b-5a96c79558d2" providerId="ADAL" clId="{CC0A1D89-ECE3-41D7-9B03-DABCAEFDE813}" dt="2021-02-01T06:05:15.337" v="63" actId="12789"/>
+          <ac:spMkLst>
+            <pc:docMk/>
+            <pc:sldMk cId="2717091713" sldId="256"/>
+            <ac:spMk id="17" creationId="{29463C14-E814-4579-B2D6-F284734CFD25}"/>
+          </ac:spMkLst>
+        </pc:spChg>
+        <pc:spChg chg="add mod">
+          <ac:chgData name="David Caldas" userId="04af3e41-9f26-4099-bc8b-5a96c79558d2" providerId="ADAL" clId="{CC0A1D89-ECE3-41D7-9B03-DABCAEFDE813}" dt="2021-02-01T06:05:08.122" v="62" actId="12789"/>
+          <ac:spMkLst>
+            <pc:docMk/>
+            <pc:sldMk cId="2717091713" sldId="256"/>
+            <ac:spMk id="18" creationId="{BFC27F27-C68F-40AB-80FA-E048AEC22178}"/>
+          </ac:spMkLst>
+        </pc:spChg>
+        <pc:spChg chg="add mod">
+          <ac:chgData name="David Caldas" userId="04af3e41-9f26-4099-bc8b-5a96c79558d2" providerId="ADAL" clId="{CC0A1D89-ECE3-41D7-9B03-DABCAEFDE813}" dt="2021-02-01T06:05:34.104" v="65" actId="1076"/>
+          <ac:spMkLst>
+            <pc:docMk/>
+            <pc:sldMk cId="2717091713" sldId="256"/>
+            <ac:spMk id="19" creationId="{F50A02C7-7AE5-47F6-9B53-E82ACE4CE0C4}"/>
+          </ac:spMkLst>
+        </pc:spChg>
+      </pc:sldChg>
+    </pc:docChg>
+  </pc:docChgLst>
+</pc:chgInfo>
+</file>
+
 <file path=ppt/slideLayouts/slideLayout1.xml><?xml version="1.0" encoding="utf-8"?>
 <p:sldLayout xmlns:a="http://schemas.openxmlformats.org/drawingml/2006/main" xmlns:r="http://schemas.openxmlformats.org/officeDocument/2006/relationships" xmlns:p="http://schemas.openxmlformats.org/presentationml/2006/main" type="title" preserve="1">
   <p:cSld name="Title Slide">
@@ -259,7 +400,7 @@
           <a:p>
             <a:fld id="{8F6B8F7E-561F-4D0C-80D5-A06481037D10}" type="datetimeFigureOut">
               <a:rPr lang="en-US" smtClean="0"/>
-              <a:t>7/20/2018</a:t>
+              <a:t>2/1/2021</a:t>
             </a:fld>
             <a:endParaRPr lang="en-US"/>
           </a:p>
@@ -457,7 +598,7 @@
           <a:p>
             <a:fld id="{8F6B8F7E-561F-4D0C-80D5-A06481037D10}" type="datetimeFigureOut">
               <a:rPr lang="en-US" smtClean="0"/>
-              <a:t>7/20/2018</a:t>
+              <a:t>2/1/2021</a:t>
             </a:fld>
             <a:endParaRPr lang="en-US"/>
           </a:p>
@@ -665,7 +806,7 @@
           <a:p>
             <a:fld id="{8F6B8F7E-561F-4D0C-80D5-A06481037D10}" type="datetimeFigureOut">
               <a:rPr lang="en-US" smtClean="0"/>
-              <a:t>7/20/2018</a:t>
+              <a:t>2/1/2021</a:t>
             </a:fld>
             <a:endParaRPr lang="en-US"/>
           </a:p>
@@ -863,7 +1004,7 @@
           <a:p>
             <a:fld id="{8F6B8F7E-561F-4D0C-80D5-A06481037D10}" type="datetimeFigureOut">
               <a:rPr lang="en-US" smtClean="0"/>
-              <a:t>7/20/2018</a:t>
+              <a:t>2/1/2021</a:t>
             </a:fld>
             <a:endParaRPr lang="en-US"/>
           </a:p>
@@ -1138,7 +1279,7 @@
           <a:p>
             <a:fld id="{8F6B8F7E-561F-4D0C-80D5-A06481037D10}" type="datetimeFigureOut">
               <a:rPr lang="en-US" smtClean="0"/>
-              <a:t>7/20/2018</a:t>
+              <a:t>2/1/2021</a:t>
             </a:fld>
             <a:endParaRPr lang="en-US"/>
           </a:p>
@@ -1403,7 +1544,7 @@
           <a:p>
             <a:fld id="{8F6B8F7E-561F-4D0C-80D5-A06481037D10}" type="datetimeFigureOut">
               <a:rPr lang="en-US" smtClean="0"/>
-              <a:t>7/20/2018</a:t>
+              <a:t>2/1/2021</a:t>
             </a:fld>
             <a:endParaRPr lang="en-US"/>
           </a:p>
@@ -1815,7 +1956,7 @@
           <a:p>
             <a:fld id="{8F6B8F7E-561F-4D0C-80D5-A06481037D10}" type="datetimeFigureOut">
               <a:rPr lang="en-US" smtClean="0"/>
-              <a:t>7/20/2018</a:t>
+              <a:t>2/1/2021</a:t>
             </a:fld>
             <a:endParaRPr lang="en-US"/>
           </a:p>
@@ -1956,7 +2097,7 @@
           <a:p>
             <a:fld id="{8F6B8F7E-561F-4D0C-80D5-A06481037D10}" type="datetimeFigureOut">
               <a:rPr lang="en-US" smtClean="0"/>
-              <a:t>7/20/2018</a:t>
+              <a:t>2/1/2021</a:t>
             </a:fld>
             <a:endParaRPr lang="en-US"/>
           </a:p>
@@ -2069,7 +2210,7 @@
           <a:p>
             <a:fld id="{8F6B8F7E-561F-4D0C-80D5-A06481037D10}" type="datetimeFigureOut">
               <a:rPr lang="en-US" smtClean="0"/>
-              <a:t>7/20/2018</a:t>
+              <a:t>2/1/2021</a:t>
             </a:fld>
             <a:endParaRPr lang="en-US"/>
           </a:p>
@@ -2380,7 +2521,7 @@
           <a:p>
             <a:fld id="{8F6B8F7E-561F-4D0C-80D5-A06481037D10}" type="datetimeFigureOut">
               <a:rPr lang="en-US" smtClean="0"/>
-              <a:t>7/20/2018</a:t>
+              <a:t>2/1/2021</a:t>
             </a:fld>
             <a:endParaRPr lang="en-US"/>
           </a:p>
@@ -2668,7 +2809,7 @@
           <a:p>
             <a:fld id="{8F6B8F7E-561F-4D0C-80D5-A06481037D10}" type="datetimeFigureOut">
               <a:rPr lang="en-US" smtClean="0"/>
-              <a:t>7/20/2018</a:t>
+              <a:t>2/1/2021</a:t>
             </a:fld>
             <a:endParaRPr lang="en-US"/>
           </a:p>
@@ -2909,7 +3050,7 @@
           <a:p>
             <a:fld id="{8F6B8F7E-561F-4D0C-80D5-A06481037D10}" type="datetimeFigureOut">
               <a:rPr lang="en-US" smtClean="0"/>
-              <a:t>7/20/2018</a:t>
+              <a:t>2/1/2021</a:t>
             </a:fld>
             <a:endParaRPr lang="en-US"/>
           </a:p>
@@ -3440,7 +3581,7 @@
         </p:nvSpPr>
         <p:spPr>
           <a:xfrm>
-            <a:off x="1591407" y="1529862"/>
+            <a:off x="1591407" y="1528213"/>
             <a:ext cx="2558561" cy="474785"/>
           </a:xfrm>
           <a:prstGeom prst="rect">
@@ -3488,7 +3629,7 @@
         </p:nvSpPr>
         <p:spPr>
           <a:xfrm>
-            <a:off x="1591407" y="2171701"/>
+            <a:off x="1591407" y="2168403"/>
             <a:ext cx="2558561" cy="474785"/>
           </a:xfrm>
           <a:prstGeom prst="rect">
@@ -3543,7 +3684,7 @@
         </p:nvSpPr>
         <p:spPr>
           <a:xfrm>
-            <a:off x="1591407" y="2800349"/>
+            <a:off x="1591407" y="2808593"/>
             <a:ext cx="2558561" cy="474785"/>
           </a:xfrm>
           <a:prstGeom prst="rect">
@@ -3667,8 +3808,8 @@
           <a:p>
             <a:pPr algn="ctr"/>
             <a:r>
-              <a:rPr lang="en-US" dirty="0"/>
-              <a:t>After Save</a:t>
+              <a:rPr lang="en-US" sz="1400" dirty="0"/>
+              <a:t>Before Collection Entity Initialize</a:t>
             </a:r>
           </a:p>
         </p:txBody>
@@ -3687,8 +3828,8 @@
         </p:nvSpPr>
         <p:spPr>
           <a:xfrm>
-            <a:off x="6719144" y="888024"/>
-            <a:ext cx="1019908" cy="2387110"/>
+            <a:off x="6719144" y="720970"/>
+            <a:ext cx="1019908" cy="3719382"/>
           </a:xfrm>
           <a:prstGeom prst="downArrow">
             <a:avLst/>
@@ -3739,7 +3880,7 @@
         </p:nvSpPr>
         <p:spPr>
           <a:xfrm>
-            <a:off x="7114797" y="1055077"/>
+            <a:off x="7114796" y="888023"/>
             <a:ext cx="2558561" cy="474785"/>
           </a:xfrm>
           <a:prstGeom prst="rect">
@@ -3787,7 +3928,7 @@
         </p:nvSpPr>
         <p:spPr>
           <a:xfrm>
-            <a:off x="7114797" y="1696916"/>
+            <a:off x="7114795" y="1528213"/>
             <a:ext cx="2558561" cy="474785"/>
           </a:xfrm>
           <a:prstGeom prst="rect">
@@ -3835,7 +3976,7 @@
         </p:nvSpPr>
         <p:spPr>
           <a:xfrm>
-            <a:off x="7114797" y="2409093"/>
+            <a:off x="7114794" y="3448783"/>
             <a:ext cx="2558561" cy="474785"/>
           </a:xfrm>
           <a:prstGeom prst="rect">
@@ -3865,6 +4006,198 @@
             <a:r>
               <a:rPr lang="en-US" dirty="0"/>
               <a:t>Before Save</a:t>
+            </a:r>
+          </a:p>
+        </p:txBody>
+      </p:sp>
+      <p:sp>
+        <p:nvSpPr>
+          <p:cNvPr id="15" name="Rectangle 14">
+            <a:extLst>
+              <a:ext uri="{FF2B5EF4-FFF2-40B4-BE49-F238E27FC236}">
+                <a16:creationId xmlns:a16="http://schemas.microsoft.com/office/drawing/2014/main" id="{7A56AD5C-657F-450B-B846-C7693E83340A}"/>
+              </a:ext>
+            </a:extLst>
+          </p:cNvPr>
+          <p:cNvSpPr/>
+          <p:nvPr/>
+        </p:nvSpPr>
+        <p:spPr>
+          <a:xfrm>
+            <a:off x="1591404" y="5136906"/>
+            <a:ext cx="2558561" cy="474785"/>
+          </a:xfrm>
+          <a:prstGeom prst="rect">
+            <a:avLst/>
+          </a:prstGeom>
+          <a:ln/>
+        </p:spPr>
+        <p:style>
+          <a:lnRef idx="3">
+            <a:schemeClr val="lt1"/>
+          </a:lnRef>
+          <a:fillRef idx="1">
+            <a:schemeClr val="accent2"/>
+          </a:fillRef>
+          <a:effectRef idx="1">
+            <a:schemeClr val="accent2"/>
+          </a:effectRef>
+          <a:fontRef idx="minor">
+            <a:schemeClr val="lt1"/>
+          </a:fontRef>
+        </p:style>
+        <p:txBody>
+          <a:bodyPr rtlCol="0" anchor="ctr"/>
+          <a:lstStyle/>
+          <a:p>
+            <a:pPr algn="ctr"/>
+            <a:r>
+              <a:rPr lang="en-US" dirty="0"/>
+              <a:t>After Save</a:t>
+            </a:r>
+          </a:p>
+        </p:txBody>
+      </p:sp>
+      <p:sp>
+        <p:nvSpPr>
+          <p:cNvPr id="16" name="Rectangle 15">
+            <a:extLst>
+              <a:ext uri="{FF2B5EF4-FFF2-40B4-BE49-F238E27FC236}">
+                <a16:creationId xmlns:a16="http://schemas.microsoft.com/office/drawing/2014/main" id="{4B0377CE-D3FF-46D3-869E-AB54D7B7752E}"/>
+              </a:ext>
+            </a:extLst>
+          </p:cNvPr>
+          <p:cNvSpPr/>
+          <p:nvPr/>
+        </p:nvSpPr>
+        <p:spPr>
+          <a:xfrm>
+            <a:off x="7114794" y="2168403"/>
+            <a:ext cx="2558561" cy="474785"/>
+          </a:xfrm>
+          <a:prstGeom prst="rect">
+            <a:avLst/>
+          </a:prstGeom>
+          <a:ln/>
+        </p:spPr>
+        <p:style>
+          <a:lnRef idx="3">
+            <a:schemeClr val="lt1"/>
+          </a:lnRef>
+          <a:fillRef idx="1">
+            <a:schemeClr val="accent5"/>
+          </a:fillRef>
+          <a:effectRef idx="1">
+            <a:schemeClr val="accent5"/>
+          </a:effectRef>
+          <a:fontRef idx="minor">
+            <a:schemeClr val="lt1"/>
+          </a:fontRef>
+        </p:style>
+        <p:txBody>
+          <a:bodyPr rtlCol="0" anchor="ctr"/>
+          <a:lstStyle/>
+          <a:p>
+            <a:pPr algn="ctr"/>
+            <a:r>
+              <a:rPr lang="en-US" dirty="0"/>
+              <a:t>Before Change</a:t>
+            </a:r>
+          </a:p>
+        </p:txBody>
+      </p:sp>
+      <p:sp>
+        <p:nvSpPr>
+          <p:cNvPr id="18" name="Rectangle 17">
+            <a:extLst>
+              <a:ext uri="{FF2B5EF4-FFF2-40B4-BE49-F238E27FC236}">
+                <a16:creationId xmlns:a16="http://schemas.microsoft.com/office/drawing/2014/main" id="{BFC27F27-C68F-40AB-80FA-E048AEC22178}"/>
+              </a:ext>
+            </a:extLst>
+          </p:cNvPr>
+          <p:cNvSpPr/>
+          <p:nvPr/>
+        </p:nvSpPr>
+        <p:spPr>
+          <a:xfrm>
+            <a:off x="7114794" y="2808593"/>
+            <a:ext cx="2558561" cy="474785"/>
+          </a:xfrm>
+          <a:prstGeom prst="rect">
+            <a:avLst/>
+          </a:prstGeom>
+          <a:ln/>
+        </p:spPr>
+        <p:style>
+          <a:lnRef idx="3">
+            <a:schemeClr val="lt1"/>
+          </a:lnRef>
+          <a:fillRef idx="1">
+            <a:schemeClr val="accent5"/>
+          </a:fillRef>
+          <a:effectRef idx="1">
+            <a:schemeClr val="accent5"/>
+          </a:effectRef>
+          <a:fontRef idx="minor">
+            <a:schemeClr val="lt1"/>
+          </a:fontRef>
+        </p:style>
+        <p:txBody>
+          <a:bodyPr rtlCol="0" anchor="ctr"/>
+          <a:lstStyle/>
+          <a:p>
+            <a:pPr algn="ctr"/>
+            <a:r>
+              <a:rPr lang="en-US" dirty="0"/>
+              <a:t>After Change</a:t>
+            </a:r>
+          </a:p>
+        </p:txBody>
+      </p:sp>
+      <p:sp>
+        <p:nvSpPr>
+          <p:cNvPr id="19" name="Rectangle 18">
+            <a:extLst>
+              <a:ext uri="{FF2B5EF4-FFF2-40B4-BE49-F238E27FC236}">
+                <a16:creationId xmlns:a16="http://schemas.microsoft.com/office/drawing/2014/main" id="{F50A02C7-7AE5-47F6-9B53-E82ACE4CE0C4}"/>
+              </a:ext>
+            </a:extLst>
+          </p:cNvPr>
+          <p:cNvSpPr/>
+          <p:nvPr/>
+        </p:nvSpPr>
+        <p:spPr>
+          <a:xfrm>
+            <a:off x="7114793" y="4594214"/>
+            <a:ext cx="2558561" cy="474785"/>
+          </a:xfrm>
+          <a:prstGeom prst="rect">
+            <a:avLst/>
+          </a:prstGeom>
+          <a:ln/>
+        </p:spPr>
+        <p:style>
+          <a:lnRef idx="3">
+            <a:schemeClr val="lt1"/>
+          </a:lnRef>
+          <a:fillRef idx="1">
+            <a:schemeClr val="accent2"/>
+          </a:fillRef>
+          <a:effectRef idx="1">
+            <a:schemeClr val="accent2"/>
+          </a:effectRef>
+          <a:fontRef idx="minor">
+            <a:schemeClr val="lt1"/>
+          </a:fontRef>
+        </p:style>
+        <p:txBody>
+          <a:bodyPr rtlCol="0" anchor="ctr"/>
+          <a:lstStyle/>
+          <a:p>
+            <a:pPr algn="ctr"/>
+            <a:r>
+              <a:rPr lang="en-US" sz="1400" dirty="0"/>
+              <a:t>Before Collection Entity Initialize</a:t>
             </a:r>
           </a:p>
         </p:txBody>

</xml_diff>